<commit_message>
Added some time formatting consistency adjustments
</commit_message>
<xml_diff>
--- a/Instructions/Connection Presentation.pptx
+++ b/Instructions/Connection Presentation.pptx
@@ -286,7 +286,7 @@
           <a:p>
             <a:fld id="{47A1B1CC-235D-474F-BE32-1508507563F7}" type="datetimeFigureOut">
               <a:rPr lang="en-US" smtClean="0"/>
-              <a:t>7/27/2017</a:t>
+              <a:t>8/8/2017</a:t>
             </a:fld>
             <a:endParaRPr lang="en-US"/>
           </a:p>
@@ -484,7 +484,7 @@
           <a:p>
             <a:fld id="{47A1B1CC-235D-474F-BE32-1508507563F7}" type="datetimeFigureOut">
               <a:rPr lang="en-US" smtClean="0"/>
-              <a:t>7/27/2017</a:t>
+              <a:t>8/8/2017</a:t>
             </a:fld>
             <a:endParaRPr lang="en-US"/>
           </a:p>
@@ -692,7 +692,7 @@
           <a:p>
             <a:fld id="{47A1B1CC-235D-474F-BE32-1508507563F7}" type="datetimeFigureOut">
               <a:rPr lang="en-US" smtClean="0"/>
-              <a:t>7/27/2017</a:t>
+              <a:t>8/8/2017</a:t>
             </a:fld>
             <a:endParaRPr lang="en-US"/>
           </a:p>
@@ -890,7 +890,7 @@
           <a:p>
             <a:fld id="{47A1B1CC-235D-474F-BE32-1508507563F7}" type="datetimeFigureOut">
               <a:rPr lang="en-US" smtClean="0"/>
-              <a:t>7/27/2017</a:t>
+              <a:t>8/8/2017</a:t>
             </a:fld>
             <a:endParaRPr lang="en-US"/>
           </a:p>
@@ -1165,7 +1165,7 @@
           <a:p>
             <a:fld id="{47A1B1CC-235D-474F-BE32-1508507563F7}" type="datetimeFigureOut">
               <a:rPr lang="en-US" smtClean="0"/>
-              <a:t>7/27/2017</a:t>
+              <a:t>8/8/2017</a:t>
             </a:fld>
             <a:endParaRPr lang="en-US"/>
           </a:p>
@@ -1430,7 +1430,7 @@
           <a:p>
             <a:fld id="{47A1B1CC-235D-474F-BE32-1508507563F7}" type="datetimeFigureOut">
               <a:rPr lang="en-US" smtClean="0"/>
-              <a:t>7/27/2017</a:t>
+              <a:t>8/8/2017</a:t>
             </a:fld>
             <a:endParaRPr lang="en-US"/>
           </a:p>
@@ -1842,7 +1842,7 @@
           <a:p>
             <a:fld id="{47A1B1CC-235D-474F-BE32-1508507563F7}" type="datetimeFigureOut">
               <a:rPr lang="en-US" smtClean="0"/>
-              <a:t>7/27/2017</a:t>
+              <a:t>8/8/2017</a:t>
             </a:fld>
             <a:endParaRPr lang="en-US"/>
           </a:p>
@@ -1983,7 +1983,7 @@
           <a:p>
             <a:fld id="{47A1B1CC-235D-474F-BE32-1508507563F7}" type="datetimeFigureOut">
               <a:rPr lang="en-US" smtClean="0"/>
-              <a:t>7/27/2017</a:t>
+              <a:t>8/8/2017</a:t>
             </a:fld>
             <a:endParaRPr lang="en-US"/>
           </a:p>
@@ -2096,7 +2096,7 @@
           <a:p>
             <a:fld id="{47A1B1CC-235D-474F-BE32-1508507563F7}" type="datetimeFigureOut">
               <a:rPr lang="en-US" smtClean="0"/>
-              <a:t>7/27/2017</a:t>
+              <a:t>8/8/2017</a:t>
             </a:fld>
             <a:endParaRPr lang="en-US"/>
           </a:p>
@@ -2407,7 +2407,7 @@
           <a:p>
             <a:fld id="{47A1B1CC-235D-474F-BE32-1508507563F7}" type="datetimeFigureOut">
               <a:rPr lang="en-US" smtClean="0"/>
-              <a:t>7/27/2017</a:t>
+              <a:t>8/8/2017</a:t>
             </a:fld>
             <a:endParaRPr lang="en-US"/>
           </a:p>
@@ -2695,7 +2695,7 @@
           <a:p>
             <a:fld id="{47A1B1CC-235D-474F-BE32-1508507563F7}" type="datetimeFigureOut">
               <a:rPr lang="en-US" smtClean="0"/>
-              <a:t>7/27/2017</a:t>
+              <a:t>8/8/2017</a:t>
             </a:fld>
             <a:endParaRPr lang="en-US"/>
           </a:p>
@@ -2936,7 +2936,7 @@
           <a:p>
             <a:fld id="{47A1B1CC-235D-474F-BE32-1508507563F7}" type="datetimeFigureOut">
               <a:rPr lang="en-US" smtClean="0"/>
-              <a:t>7/27/2017</a:t>
+              <a:t>8/8/2017</a:t>
             </a:fld>
             <a:endParaRPr lang="en-US"/>
           </a:p>
@@ -4097,7 +4097,7 @@
                 <a:latin typeface="Montserrat" panose="00000500000000000000" pitchFamily="2" charset="0"/>
                 <a:ea typeface="Roboto" panose="02000000000000000000" pitchFamily="2" charset="0"/>
               </a:rPr>
-              <a:t>Left click on the network icon in the bottom right hand side of the screen</a:t>
+              <a:t>Right click on the network icon in the bottom right hand side of the screen</a:t>
             </a:r>
           </a:p>
         </p:txBody>

</xml_diff>